<commit_message>
update Missile Guidance.pptx: change problem #2 from collaboration/github to switches vs. buttons detection
</commit_message>
<xml_diff>
--- a/src/main/resources/Missile Guidance.pptx
+++ b/src/main/resources/Missile Guidance.pptx
@@ -3134,71 +3134,8 @@
                   </a:schemeClr>
                 </a:solidFill>
               </a:rPr>
-              <a:t>Team : </a:t>
-            </a:r>
-            <a:r>
-              <a:rPr lang="en-US" dirty="0" smtClean="0">
-                <a:solidFill>
-                  <a:schemeClr val="tx1">
-                    <a:lumMod val="65000"/>
-                    <a:lumOff val="35000"/>
-                  </a:schemeClr>
-                </a:solidFill>
-              </a:rPr>
-              <a:t>Ariful</a:t>
-            </a:r>
-            <a:r>
-              <a:rPr lang="en-US" dirty="0" smtClean="0">
-                <a:solidFill>
-                  <a:schemeClr val="tx1">
-                    <a:lumMod val="65000"/>
-                    <a:lumOff val="35000"/>
-                  </a:schemeClr>
-                </a:solidFill>
-              </a:rPr>
-              <a:t> </a:t>
-            </a:r>
-            <a:r>
-              <a:rPr lang="en-US" dirty="0" smtClean="0">
-                <a:solidFill>
-                  <a:schemeClr val="tx1">
-                    <a:lumMod val="65000"/>
-                    <a:lumOff val="35000"/>
-                  </a:schemeClr>
-                </a:solidFill>
-              </a:rPr>
-              <a:t>Hoque</a:t>
-            </a:r>
-            <a:r>
-              <a:rPr lang="en-US" dirty="0" smtClean="0">
-                <a:solidFill>
-                  <a:schemeClr val="tx1">
-                    <a:lumMod val="65000"/>
-                    <a:lumOff val="35000"/>
-                  </a:schemeClr>
-                </a:solidFill>
-              </a:rPr>
-              <a:t>, </a:t>
-            </a:r>
-            <a:r>
-              <a:rPr lang="en-US" dirty="0" smtClean="0">
-                <a:solidFill>
-                  <a:schemeClr val="tx1">
-                    <a:lumMod val="65000"/>
-                    <a:lumOff val="35000"/>
-                  </a:schemeClr>
-                </a:solidFill>
-              </a:rPr>
-              <a:t>Matt Evans, James Zuckerman</a:t>
-            </a:r>
-            <a:endParaRPr lang="en-US" dirty="0" smtClean="0">
-              <a:solidFill>
-                <a:schemeClr val="tx1">
-                  <a:lumMod val="65000"/>
-                  <a:lumOff val="35000"/>
-                </a:schemeClr>
-              </a:solidFill>
-            </a:endParaRPr>
+              <a:t>Team : Ariful Hoque, Matt Evans, James Zuckerman</a:t>
+            </a:r>
           </a:p>
           <a:p>
             <a:endParaRPr lang="en-US" dirty="0"/>
@@ -3369,10 +3306,6 @@
             <a:r>
               <a:rPr lang="en-US" dirty="0"/>
               <a:t>  </a:t>
-            </a:r>
-            <a:r>
-              <a:rPr lang="en-US" dirty="0"/>
-              <a:t/>
             </a:r>
             <a:br>
               <a:rPr lang="en-US" dirty="0"/>
@@ -3533,10 +3466,6 @@
             <a:r>
               <a:rPr lang="en-US" dirty="0"/>
               <a:t>  </a:t>
-            </a:r>
-            <a:r>
-              <a:rPr lang="en-US" dirty="0"/>
-              <a:t/>
             </a:r>
             <a:br>
               <a:rPr lang="en-US" dirty="0"/>
@@ -3748,11 +3677,7 @@
             </a:pPr>
             <a:r>
               <a:rPr lang="en-US" dirty="0" smtClean="0"/>
-              <a:t>Problems</a:t>
-            </a:r>
-            <a:r>
-              <a:rPr lang="en-US" dirty="0" smtClean="0"/>
-              <a:t>:</a:t>
+              <a:t>Problems:</a:t>
             </a:r>
           </a:p>
           <a:p>
@@ -3776,15 +3701,7 @@
             </a:r>
             <a:r>
               <a:rPr lang="en-US" dirty="0" smtClean="0"/>
-              <a:t> – use C library function </a:t>
-            </a:r>
-            <a:r>
-              <a:rPr lang="en-US" dirty="0" smtClean="0"/>
-              <a:t>sprintf</a:t>
-            </a:r>
-            <a:r>
-              <a:rPr lang="en-US" dirty="0" smtClean="0"/>
-              <a:t>() to convert double to char array</a:t>
+              <a:t> – use C library function sprintf() to convert double to char array</a:t>
             </a:r>
             <a:endParaRPr lang="en-US" dirty="0"/>
           </a:p>
@@ -3795,8 +3712,9 @@
             </a:pPr>
             <a:r>
               <a:rPr lang="en-US" dirty="0" smtClean="0"/>
-              <a:t>How to collaborate as team on code</a:t>
-            </a:r>
+              <a:t>How to use switches for timer</a:t>
+            </a:r>
+            <a:endParaRPr lang="en-US" dirty="0" smtClean="0"/>
           </a:p>
           <a:p>
             <a:pPr marL="914400" lvl="1" indent="-457200">
@@ -3808,11 +3726,15 @@
             </a:r>
             <a:r>
               <a:rPr lang="en-US" dirty="0" smtClean="0"/>
-              <a:t>– use </a:t>
-            </a:r>
-            <a:r>
-              <a:rPr lang="en-US" dirty="0" smtClean="0"/>
-              <a:t>Github</a:t>
+              <a:t>– </a:t>
+            </a:r>
+            <a:r>
+              <a:rPr lang="en-US" dirty="0" smtClean="0"/>
+              <a:t>use buttons and nest a while loop inside </a:t>
+            </a:r>
+            <a:r>
+              <a:rPr lang="en-US" smtClean="0"/>
+              <a:t>an if/else</a:t>
             </a:r>
             <a:endParaRPr lang="en-US" dirty="0" smtClean="0"/>
           </a:p>
@@ -3822,15 +3744,7 @@
             </a:pPr>
             <a:r>
               <a:rPr lang="en-US" dirty="0" smtClean="0"/>
-              <a:t>Received </a:t>
-            </a:r>
-            <a:r>
-              <a:rPr lang="en-US" dirty="0" smtClean="0"/>
-              <a:t>NaN</a:t>
-            </a:r>
-            <a:r>
-              <a:rPr lang="en-US" dirty="0" smtClean="0"/>
-              <a:t> Output for angle value when timer was low</a:t>
+              <a:t>Received NaN Output for angle value when timer was low</a:t>
             </a:r>
           </a:p>
           <a:p>
@@ -3873,28 +3787,20 @@
             </a:pPr>
             <a:r>
               <a:rPr lang="en-US" dirty="0"/>
-              <a:t>4.687133 returns </a:t>
-            </a:r>
+              <a:t>4.687133 returns NaN</a:t>
+            </a:r>
+            <a:r>
+              <a:rPr lang="en-US" dirty="0" smtClean="0"/>
+              <a:t>.</a:t>
+            </a:r>
+          </a:p>
+          <a:p>
+            <a:pPr marL="914400" lvl="2" indent="0">
+              <a:buNone/>
+            </a:pPr>
             <a:r>
               <a:rPr lang="en-US" dirty="0"/>
-              <a:t>NaN</a:t>
-            </a:r>
-            <a:r>
-              <a:rPr lang="en-US" dirty="0" smtClean="0"/>
-              <a:t>.</a:t>
-            </a:r>
-          </a:p>
-          <a:p>
-            <a:pPr marL="914400" lvl="2" indent="0">
-              <a:buNone/>
-            </a:pPr>
-            <a:r>
-              <a:rPr lang="en-US" dirty="0"/>
-              <a:t>Output “drone 2 fast” if angle &lt; 4.7 </a:t>
-            </a:r>
-            <a:r>
-              <a:rPr lang="en-US" dirty="0"/>
-              <a:t>ms</a:t>
+              <a:t>Output “drone 2 fast” if angle &lt; 4.7 ms</a:t>
             </a:r>
             <a:r>
               <a:rPr lang="en-US" dirty="0" smtClean="0"/>
@@ -3995,11 +3901,7 @@
             </a:pPr>
             <a:r>
               <a:rPr lang="en-US" dirty="0" smtClean="0"/>
-              <a:t>Problems</a:t>
-            </a:r>
-            <a:r>
-              <a:rPr lang="en-US" dirty="0" smtClean="0"/>
-              <a:t>:</a:t>
+              <a:t>Problems:</a:t>
             </a:r>
           </a:p>
           <a:p>
@@ -4173,7 +4075,6 @@
               <a:rPr lang="en-US" dirty="0"/>
               <a:t>Solutions (Contd.) </a:t>
             </a:r>
-            <a:endParaRPr lang="en-US" dirty="0"/>
           </a:p>
         </p:txBody>
       </p:sp>
@@ -4404,11 +4305,7 @@
             <a:pPr lvl="2"/>
             <a:r>
               <a:rPr lang="en-US" dirty="0" smtClean="0"/>
-              <a:t>Debounce</a:t>
-            </a:r>
-            <a:r>
-              <a:rPr lang="en-US" dirty="0" smtClean="0"/>
-              <a:t> functionality was only implemented for button 1.  It was NOT implemented for button 2.</a:t>
+              <a:t>Debounce functionality was only implemented for button 1.  It was NOT implemented for button 2.</a:t>
             </a:r>
           </a:p>
           <a:p>
@@ -4450,7 +4347,6 @@
               <a:rPr lang="en-US" dirty="0" smtClean="0"/>
               <a:t>Variables are set and fetched with Java-like getters and setters</a:t>
             </a:r>
-            <a:endParaRPr lang="en-US" dirty="0" smtClean="0"/>
           </a:p>
         </p:txBody>
       </p:sp>
@@ -4843,11 +4739,7 @@
             <a:pPr lvl="2"/>
             <a:r>
               <a:rPr lang="en-US" dirty="0" smtClean="0"/>
-              <a:t>Missile Speed set at Mach II (768 </a:t>
-            </a:r>
-            <a:r>
-              <a:rPr lang="en-US" dirty="0" smtClean="0"/>
-              <a:t>mph)</a:t>
+              <a:t>Missile Speed set at Mach II (768 mph)</a:t>
             </a:r>
           </a:p>
           <a:p>
@@ -4861,11 +4753,7 @@
             <a:pPr lvl="1"/>
             <a:r>
               <a:rPr lang="en-US" dirty="0" smtClean="0"/>
-              <a:t>Verify </a:t>
-            </a:r>
-            <a:r>
-              <a:rPr lang="en-US" dirty="0" smtClean="0"/>
-              <a:t>Target Hit</a:t>
+              <a:t>Verify Target Hit</a:t>
             </a:r>
             <a:endParaRPr lang="en-US" dirty="0"/>
           </a:p>
@@ -5066,19 +4954,11 @@
           <a:p>
             <a:r>
               <a:rPr lang="en-US" dirty="0"/>
-              <a:t>chipKIT</a:t>
-            </a:r>
-            <a:r>
-              <a:rPr lang="en-US" dirty="0"/>
-              <a:t>™ Max32™ Board </a:t>
-            </a:r>
-            <a:r>
-              <a:rPr lang="en-US" dirty="0" smtClean="0"/>
-              <a:t>:: </a:t>
-            </a:r>
-            <a:r>
-              <a:rPr lang="en-US" dirty="0" smtClean="0"/>
-              <a:t>chipKIT</a:t>
+              <a:t>chipKIT™ Max32™ Board </a:t>
+            </a:r>
+            <a:r>
+              <a:rPr lang="en-US" dirty="0" smtClean="0"/>
+              <a:t>:: chipKIT</a:t>
             </a:r>
             <a:r>
               <a:rPr lang="en-US" dirty="0"/>
@@ -5255,7 +5135,6 @@
               <a:rPr lang="en-US" dirty="0" smtClean="0"/>
               <a:t>Hardware: input: USB port</a:t>
             </a:r>
-            <a:endParaRPr lang="en-US" dirty="0" smtClean="0"/>
           </a:p>
           <a:p>
             <a:pPr lvl="2"/>
@@ -5270,7 +5149,6 @@
               <a:rPr lang="en-US" dirty="0" smtClean="0"/>
               <a:t>Cables: mini USB</a:t>
             </a:r>
-            <a:endParaRPr lang="en-US" dirty="0" smtClean="0"/>
           </a:p>
         </p:txBody>
       </p:sp>
@@ -5361,11 +5239,7 @@
             <a:pPr algn="ctr"/>
             <a:r>
               <a:rPr lang="en-US" dirty="0" smtClean="0"/>
-              <a:t>Design </a:t>
-            </a:r>
-            <a:r>
-              <a:rPr lang="en-US" dirty="0" smtClean="0"/>
-              <a:t>Features &amp; Sample Codes</a:t>
+              <a:t>Design Features &amp; Sample Codes</a:t>
             </a:r>
             <a:endParaRPr lang="en-US" dirty="0"/>
           </a:p>
@@ -5448,10 +5322,6 @@
             <a:r>
               <a:rPr lang="en-US" dirty="0"/>
               <a:t>  </a:t>
-            </a:r>
-            <a:r>
-              <a:rPr lang="en-US" dirty="0"/>
-              <a:t/>
             </a:r>
             <a:br>
               <a:rPr lang="en-US" dirty="0"/>
@@ -5598,10 +5468,6 @@
             <a:r>
               <a:rPr lang="en-US" dirty="0"/>
               <a:t>  </a:t>
-            </a:r>
-            <a:r>
-              <a:rPr lang="en-US" dirty="0"/>
-              <a:t/>
             </a:r>
             <a:br>
               <a:rPr lang="en-US" dirty="0"/>

</xml_diff>